<commit_message>
docs: presentation and readme update
</commit_message>
<xml_diff>
--- a/docs/L&L WebSockets tutorial 2022-10-06.pptx
+++ b/docs/L&L WebSockets tutorial 2022-10-06.pptx
@@ -13722,6 +13722,37 @@
                 <a:latin typeface="Roboto"/>
                 <a:ea typeface="Roboto"/>
               </a:rPr>
+              <a:t>On client side we have to decide what’s the life cycle of the socket: could be bound to the lifecycle of the component (created on mount, destroyed on unmount) but could be bound also to the whole application</a:t>
+            </a:r>
+            <a:endParaRPr b="0" lang="en-CA" sz="1400" spc="-1" strike="noStrike">
+              <a:latin typeface="Arial"/>
+            </a:endParaRPr>
+          </a:p>
+          <a:p>
+            <a:pPr marL="228600" indent="-227520">
+              <a:lnSpc>
+                <a:spcPct val="90000"/>
+              </a:lnSpc>
+              <a:spcBef>
+                <a:spcPts val="1001"/>
+              </a:spcBef>
+              <a:buClr>
+                <a:srgbClr val="8cc63f"/>
+              </a:buClr>
+              <a:buFont typeface="Arial"/>
+              <a:buChar char="•"/>
+              <a:tabLst>
+                <a:tab algn="l" pos="204120"/>
+              </a:tabLst>
+            </a:pPr>
+            <a:r>
+              <a:rPr b="0" lang="en-US" sz="1400" spc="-1" strike="noStrike">
+                <a:solidFill>
+                  <a:srgbClr val="55575b"/>
+                </a:solidFill>
+                <a:latin typeface="Roboto"/>
+                <a:ea typeface="Roboto"/>
+              </a:rPr>
               <a:t>does not include reconnection, authentication and many other high-level mechanisms. So there are client/server libraries for that, and it’s also possible to implement these capabilities manually</a:t>
             </a:r>
             <a:endParaRPr b="0" lang="en-CA" sz="1400" spc="-1" strike="noStrike">
@@ -13847,6 +13878,68 @@
                 <a:ea typeface="Roboto"/>
               </a:rPr>
               <a:t>InMemory vs Database and Messaging services for better scalability (load balancing)</a:t>
+            </a:r>
+            <a:endParaRPr b="0" lang="en-CA" sz="1400" spc="-1" strike="noStrike">
+              <a:latin typeface="Arial"/>
+            </a:endParaRPr>
+          </a:p>
+          <a:p>
+            <a:pPr marL="228600" indent="-227520">
+              <a:lnSpc>
+                <a:spcPct val="90000"/>
+              </a:lnSpc>
+              <a:spcBef>
+                <a:spcPts val="1001"/>
+              </a:spcBef>
+              <a:buClr>
+                <a:srgbClr val="8cc63f"/>
+              </a:buClr>
+              <a:buFont typeface="Arial"/>
+              <a:buChar char="•"/>
+              <a:tabLst>
+                <a:tab algn="l" pos="204120"/>
+              </a:tabLst>
+            </a:pPr>
+            <a:r>
+              <a:rPr b="0" lang="en-US" sz="1400" spc="-1" strike="noStrike">
+                <a:solidFill>
+                  <a:srgbClr val="55575b"/>
+                </a:solidFill>
+                <a:latin typeface="Roboto"/>
+                <a:ea typeface="Roboto"/>
+              </a:rPr>
+              <a:t>WebSocket usage is even simplified with Express or Nest.js</a:t>
+            </a:r>
+            <a:endParaRPr b="0" lang="en-CA" sz="1400" spc="-1" strike="noStrike">
+              <a:latin typeface="Arial"/>
+            </a:endParaRPr>
+          </a:p>
+          <a:p>
+            <a:pPr marL="228600" indent="-227520">
+              <a:lnSpc>
+                <a:spcPct val="90000"/>
+              </a:lnSpc>
+              <a:spcBef>
+                <a:spcPts val="1001"/>
+              </a:spcBef>
+              <a:buClr>
+                <a:srgbClr val="8cc63f"/>
+              </a:buClr>
+              <a:buFont typeface="Arial"/>
+              <a:buChar char="•"/>
+              <a:tabLst>
+                <a:tab algn="l" pos="204120"/>
+              </a:tabLst>
+            </a:pPr>
+            <a:r>
+              <a:rPr b="0" lang="en-US" sz="1400" spc="-1" strike="noStrike">
+                <a:solidFill>
+                  <a:srgbClr val="55575b"/>
+                </a:solidFill>
+                <a:latin typeface="Roboto"/>
+                <a:ea typeface="Roboto"/>
+              </a:rPr>
+              <a:t>Socket.io + socket.io-client is the way to go (room handling, protocol upgrade, payload types...)</a:t>
             </a:r>
             <a:endParaRPr b="0" lang="en-CA" sz="1400" spc="-1" strike="noStrike">
               <a:latin typeface="Arial"/>
@@ -14105,8 +14198,137 @@
                 </a:solidFill>
                 <a:latin typeface="Roboto"/>
                 <a:ea typeface="Roboto"/>
+                <a:hlinkClick r:id="rId1"/>
               </a:rPr>
               <a:t>https://javascript.info/websocket</a:t>
+            </a:r>
+            <a:endParaRPr b="0" lang="en-CA" sz="1400" spc="-1" strike="noStrike">
+              <a:latin typeface="Arial"/>
+            </a:endParaRPr>
+          </a:p>
+          <a:p>
+            <a:pPr marL="228600" indent="-227520">
+              <a:lnSpc>
+                <a:spcPct val="90000"/>
+              </a:lnSpc>
+              <a:spcBef>
+                <a:spcPts val="1001"/>
+              </a:spcBef>
+              <a:buClr>
+                <a:srgbClr val="8cc63f"/>
+              </a:buClr>
+              <a:buFont typeface="Arial"/>
+              <a:buChar char="•"/>
+              <a:tabLst>
+                <a:tab algn="l" pos="204120"/>
+              </a:tabLst>
+            </a:pPr>
+            <a:r>
+              <a:rPr b="0" lang="en-US" sz="1400" spc="-1" strike="noStrike">
+                <a:solidFill>
+                  <a:srgbClr val="55575b"/>
+                </a:solidFill>
+                <a:latin typeface="Roboto"/>
+                <a:ea typeface="Roboto"/>
+                <a:hlinkClick r:id="rId2"/>
+              </a:rPr>
+              <a:t>https://socket.io/</a:t>
+            </a:r>
+            <a:endParaRPr b="0" lang="en-CA" sz="1400" spc="-1" strike="noStrike">
+              <a:latin typeface="Arial"/>
+            </a:endParaRPr>
+          </a:p>
+          <a:p>
+            <a:pPr marL="228600" indent="-227520">
+              <a:lnSpc>
+                <a:spcPct val="90000"/>
+              </a:lnSpc>
+              <a:spcBef>
+                <a:spcPts val="1001"/>
+              </a:spcBef>
+              <a:buClr>
+                <a:srgbClr val="8cc63f"/>
+              </a:buClr>
+              <a:buFont typeface="Arial"/>
+              <a:buChar char="•"/>
+              <a:tabLst>
+                <a:tab algn="l" pos="204120"/>
+              </a:tabLst>
+            </a:pPr>
+            <a:r>
+              <a:rPr b="0" lang="en-US" sz="1400" spc="-1" strike="noStrike">
+                <a:solidFill>
+                  <a:srgbClr val="55575b"/>
+                </a:solidFill>
+                <a:latin typeface="Roboto"/>
+                <a:ea typeface="Roboto"/>
+                <a:hlinkClick r:id="rId3"/>
+              </a:rPr>
+              <a:t>https://www.youtube.com/watch?v=NU-HfZY3ATQ</a:t>
+            </a:r>
+            <a:endParaRPr b="0" lang="en-CA" sz="1400" spc="-1" strike="noStrike">
+              <a:latin typeface="Arial"/>
+            </a:endParaRPr>
+          </a:p>
+          <a:p>
+            <a:pPr lvl="1" marL="432000" indent="-216000">
+              <a:lnSpc>
+                <a:spcPct val="90000"/>
+              </a:lnSpc>
+              <a:spcBef>
+                <a:spcPts val="1001"/>
+              </a:spcBef>
+              <a:buClr>
+                <a:srgbClr val="000000"/>
+              </a:buClr>
+              <a:buSzPct val="45000"/>
+              <a:buFont typeface="Wingdings" charset="2"/>
+              <a:buChar char=""/>
+              <a:tabLst>
+                <a:tab algn="l" pos="204120"/>
+              </a:tabLst>
+            </a:pPr>
+            <a:r>
+              <a:rPr b="0" lang="en-US" sz="1400" spc="-1" strike="noStrike">
+                <a:solidFill>
+                  <a:srgbClr val="55575b"/>
+                </a:solidFill>
+                <a:latin typeface="Roboto"/>
+                <a:ea typeface="Roboto"/>
+              </a:rPr>
+              <a:t>BE: Express with Socket.io</a:t>
+            </a:r>
+            <a:endParaRPr b="0" lang="en-CA" sz="1400" spc="-1" strike="noStrike">
+              <a:latin typeface="Arial"/>
+            </a:endParaRPr>
+          </a:p>
+          <a:p>
+            <a:pPr lvl="1" marL="432000" indent="-216000">
+              <a:lnSpc>
+                <a:spcPct val="90000"/>
+              </a:lnSpc>
+              <a:spcBef>
+                <a:spcPts val="1001"/>
+              </a:spcBef>
+              <a:buClr>
+                <a:srgbClr val="000000"/>
+              </a:buClr>
+              <a:buSzPct val="45000"/>
+              <a:buFont typeface="Wingdings" charset="2"/>
+              <a:buChar char=""/>
+              <a:tabLst>
+                <a:tab algn="l" pos="204120"/>
+              </a:tabLst>
+            </a:pPr>
+            <a:r>
+              <a:rPr b="0" lang="en-US" sz="1400" spc="-1" strike="noStrike">
+                <a:solidFill>
+                  <a:srgbClr val="55575b"/>
+                </a:solidFill>
+                <a:latin typeface="Roboto"/>
+                <a:ea typeface="Roboto"/>
+              </a:rPr>
+              <a:t>FE: React with Socket.io-client</a:t>
             </a:r>
             <a:endParaRPr b="0" lang="en-CA" sz="1400" spc="-1" strike="noStrike">
               <a:latin typeface="Arial"/>
@@ -14168,7 +14390,7 @@
                 <a:uFillTx/>
                 <a:latin typeface="Roboto"/>
                 <a:ea typeface="Roboto"/>
-                <a:hlinkClick r:id="rId1"/>
+                <a:hlinkClick r:id="rId4"/>
               </a:rPr>
               <a:t>https://github.com/amwebexpert/ws-poker-planning</a:t>
             </a:r>

</xml_diff>